<commit_message>
before my talk in florence
</commit_message>
<xml_diff>
--- a/docs/small-yield.pptx
+++ b/docs/small-yield.pptx
@@ -261,7 +261,7 @@
           <a:p>
             <a:fld id="{465BE558-F002-4F23-BA23-0C5DBDDB9711}" type="datetimeFigureOut">
               <a:rPr lang="en-GB" smtClean="0"/>
-              <a:t>26/05/2023</a:t>
+              <a:t>27/05/2023</a:t>
             </a:fld>
             <a:endParaRPr lang="en-GB"/>
           </a:p>
@@ -431,7 +431,7 @@
           <a:p>
             <a:fld id="{465BE558-F002-4F23-BA23-0C5DBDDB9711}" type="datetimeFigureOut">
               <a:rPr lang="en-GB" smtClean="0"/>
-              <a:t>26/05/2023</a:t>
+              <a:t>27/05/2023</a:t>
             </a:fld>
             <a:endParaRPr lang="en-GB"/>
           </a:p>
@@ -611,7 +611,7 @@
           <a:p>
             <a:fld id="{465BE558-F002-4F23-BA23-0C5DBDDB9711}" type="datetimeFigureOut">
               <a:rPr lang="en-GB" smtClean="0"/>
-              <a:t>26/05/2023</a:t>
+              <a:t>27/05/2023</a:t>
             </a:fld>
             <a:endParaRPr lang="en-GB"/>
           </a:p>
@@ -781,7 +781,7 @@
           <a:p>
             <a:fld id="{465BE558-F002-4F23-BA23-0C5DBDDB9711}" type="datetimeFigureOut">
               <a:rPr lang="en-GB" smtClean="0"/>
-              <a:t>26/05/2023</a:t>
+              <a:t>27/05/2023</a:t>
             </a:fld>
             <a:endParaRPr lang="en-GB"/>
           </a:p>
@@ -1027,7 +1027,7 @@
           <a:p>
             <a:fld id="{465BE558-F002-4F23-BA23-0C5DBDDB9711}" type="datetimeFigureOut">
               <a:rPr lang="en-GB" smtClean="0"/>
-              <a:t>26/05/2023</a:t>
+              <a:t>27/05/2023</a:t>
             </a:fld>
             <a:endParaRPr lang="en-GB"/>
           </a:p>
@@ -1259,7 +1259,7 @@
           <a:p>
             <a:fld id="{465BE558-F002-4F23-BA23-0C5DBDDB9711}" type="datetimeFigureOut">
               <a:rPr lang="en-GB" smtClean="0"/>
-              <a:t>26/05/2023</a:t>
+              <a:t>27/05/2023</a:t>
             </a:fld>
             <a:endParaRPr lang="en-GB"/>
           </a:p>
@@ -1626,7 +1626,7 @@
           <a:p>
             <a:fld id="{465BE558-F002-4F23-BA23-0C5DBDDB9711}" type="datetimeFigureOut">
               <a:rPr lang="en-GB" smtClean="0"/>
-              <a:t>26/05/2023</a:t>
+              <a:t>27/05/2023</a:t>
             </a:fld>
             <a:endParaRPr lang="en-GB"/>
           </a:p>
@@ -1744,7 +1744,7 @@
           <a:p>
             <a:fld id="{465BE558-F002-4F23-BA23-0C5DBDDB9711}" type="datetimeFigureOut">
               <a:rPr lang="en-GB" smtClean="0"/>
-              <a:t>26/05/2023</a:t>
+              <a:t>27/05/2023</a:t>
             </a:fld>
             <a:endParaRPr lang="en-GB"/>
           </a:p>
@@ -1839,7 +1839,7 @@
           <a:p>
             <a:fld id="{465BE558-F002-4F23-BA23-0C5DBDDB9711}" type="datetimeFigureOut">
               <a:rPr lang="en-GB" smtClean="0"/>
-              <a:t>26/05/2023</a:t>
+              <a:t>27/05/2023</a:t>
             </a:fld>
             <a:endParaRPr lang="en-GB"/>
           </a:p>
@@ -2116,7 +2116,7 @@
           <a:p>
             <a:fld id="{465BE558-F002-4F23-BA23-0C5DBDDB9711}" type="datetimeFigureOut">
               <a:rPr lang="en-GB" smtClean="0"/>
-              <a:t>26/05/2023</a:t>
+              <a:t>27/05/2023</a:t>
             </a:fld>
             <a:endParaRPr lang="en-GB"/>
           </a:p>
@@ -2369,7 +2369,7 @@
           <a:p>
             <a:fld id="{465BE558-F002-4F23-BA23-0C5DBDDB9711}" type="datetimeFigureOut">
               <a:rPr lang="en-GB" smtClean="0"/>
-              <a:t>26/05/2023</a:t>
+              <a:t>27/05/2023</a:t>
             </a:fld>
             <a:endParaRPr lang="en-GB"/>
           </a:p>
@@ -2582,7 +2582,7 @@
           <a:p>
             <a:fld id="{465BE558-F002-4F23-BA23-0C5DBDDB9711}" type="datetimeFigureOut">
               <a:rPr lang="en-GB" smtClean="0"/>
-              <a:t>26/05/2023</a:t>
+              <a:t>27/05/2023</a:t>
             </a:fld>
             <a:endParaRPr lang="en-GB"/>
           </a:p>
@@ -3684,11 +3684,7 @@
             </a:r>
             <a:r>
               <a:rPr lang="de-AT" dirty="0" smtClean="0"/>
-              <a:t> DE </a:t>
-            </a:r>
-            <a:r>
-              <a:rPr lang="de-AT" dirty="0" smtClean="0"/>
-              <a:t>2023, April</a:t>
+              <a:t> DE 2023, April</a:t>
             </a:r>
             <a:endParaRPr lang="en-GB" dirty="0"/>
           </a:p>
@@ -3845,15 +3841,7 @@
             </a:r>
             <a:r>
               <a:rPr lang="de-AT" dirty="0" smtClean="0"/>
-              <a:t> </a:t>
-            </a:r>
-            <a:r>
-              <a:rPr lang="de-AT" dirty="0" smtClean="0"/>
-              <a:t>DE 2023</a:t>
-            </a:r>
-            <a:r>
-              <a:rPr lang="de-AT" dirty="0" smtClean="0"/>
-              <a:t>, April</a:t>
+              <a:t> DE 2023, April</a:t>
             </a:r>
             <a:endParaRPr lang="en-GB" dirty="0"/>
           </a:p>
@@ -4007,23 +3995,7 @@
             </a:r>
             <a:r>
               <a:rPr lang="de-AT" dirty="0" smtClean="0"/>
-              <a:t> </a:t>
-            </a:r>
-            <a:r>
-              <a:rPr lang="de-AT" dirty="0" smtClean="0"/>
-              <a:t>IT</a:t>
-            </a:r>
-            <a:r>
-              <a:rPr lang="de-AT" dirty="0" smtClean="0"/>
-              <a:t> 2023</a:t>
-            </a:r>
-            <a:r>
-              <a:rPr lang="de-AT" dirty="0" smtClean="0"/>
-              <a:t>, </a:t>
-            </a:r>
-            <a:r>
-              <a:rPr lang="de-AT" dirty="0" smtClean="0"/>
-              <a:t>May</a:t>
+              <a:t> IT 2023, May</a:t>
             </a:r>
             <a:endParaRPr lang="en-GB" dirty="0"/>
           </a:p>
@@ -4147,23 +4119,7 @@
             </a:r>
             <a:r>
               <a:rPr lang="de-AT" dirty="0" smtClean="0"/>
-              <a:t> </a:t>
-            </a:r>
-            <a:r>
-              <a:rPr lang="de-AT" dirty="0" smtClean="0"/>
-              <a:t>IT</a:t>
-            </a:r>
-            <a:r>
-              <a:rPr lang="de-AT" dirty="0" smtClean="0"/>
-              <a:t> 2023</a:t>
-            </a:r>
-            <a:r>
-              <a:rPr lang="de-AT" dirty="0" smtClean="0"/>
-              <a:t>, </a:t>
-            </a:r>
-            <a:r>
-              <a:rPr lang="de-AT" dirty="0" smtClean="0"/>
-              <a:t>May</a:t>
+              <a:t> IT 2023, May</a:t>
             </a:r>
             <a:endParaRPr lang="en-GB" dirty="0"/>
           </a:p>
@@ -4196,13 +4152,11 @@
       </p:sp>
       <p:pic>
         <p:nvPicPr>
-          <p:cNvPr id="5" name="Content Placeholder 4"/>
+          <p:cNvPr id="3" name="Picture 2"/>
           <p:cNvPicPr>
-            <a:picLocks noGrp="1" noChangeAspect="1"/>
+            <a:picLocks noChangeAspect="1"/>
           </p:cNvPicPr>
-          <p:nvPr>
-            <p:ph sz="half" idx="2"/>
-          </p:nvPr>
+          <p:nvPr/>
         </p:nvPicPr>
         <p:blipFill rotWithShape="1">
           <a:blip r:embed="rId2" cstate="print">
@@ -4212,16 +4166,38 @@
               </a:ext>
             </a:extLst>
           </a:blip>
-          <a:srcRect t="20630" b="23636"/>
+          <a:srcRect t="12221" r="14774" b="25556"/>
           <a:stretch/>
         </p:blipFill>
         <p:spPr>
           <a:xfrm>
-            <a:off x="6596248" y="1559281"/>
-            <a:ext cx="4565395" cy="4523466"/>
+            <a:off x="6479116" y="1825625"/>
+            <a:ext cx="4383617" cy="4267199"/>
           </a:xfrm>
+          <a:prstGeom prst="rect">
+            <a:avLst/>
+          </a:prstGeom>
         </p:spPr>
       </p:pic>
+      <p:sp>
+        <p:nvSpPr>
+          <p:cNvPr id="6" name="Content Placeholder 5"/>
+          <p:cNvSpPr>
+            <a:spLocks noGrp="1"/>
+          </p:cNvSpPr>
+          <p:nvPr>
+            <p:ph sz="half" idx="2"/>
+          </p:nvPr>
+        </p:nvSpPr>
+        <p:spPr/>
+        <p:txBody>
+          <a:bodyPr/>
+          <a:lstStyle/>
+          <a:p>
+            <a:endParaRPr lang="en-GB" dirty="0"/>
+          </a:p>
+        </p:txBody>
+      </p:sp>
     </p:spTree>
     <p:extLst>
       <p:ext uri="{BB962C8B-B14F-4D97-AF65-F5344CB8AC3E}">
@@ -5264,7 +5240,7 @@
         <p:spPr/>
         <p:txBody>
           <a:bodyPr>
-            <a:normAutofit fontScale="92500" lnSpcReduction="20000"/>
+            <a:normAutofit lnSpcReduction="10000"/>
           </a:bodyPr>
           <a:lstStyle/>
           <a:p>
@@ -5337,62 +5313,127 @@
               <a:buNone/>
             </a:pPr>
             <a:r>
-              <a:rPr lang="en-US" sz="2700" b="1" dirty="0" smtClean="0">
-                <a:solidFill>
-                  <a:srgbClr val="1E1E1E"/>
+              <a:rPr lang="de-AT" dirty="0">
+                <a:solidFill>
+                  <a:schemeClr val="tx1">
+                    <a:lumMod val="85000"/>
+                    <a:lumOff val="15000"/>
+                  </a:schemeClr>
                 </a:solidFill>
               </a:rPr>
-              <a:t>My talk about generators in ordinary life:</a:t>
-            </a:r>
-          </a:p>
-          <a:p>
-            <a:pPr marL="0" indent="0">
-              <a:buNone/>
-            </a:pPr>
-            <a:r>
-              <a:rPr lang="en-US" sz="2700" b="1" dirty="0" smtClean="0">
-                <a:solidFill>
-                  <a:srgbClr val="1E1E1E"/>
+              <a:t>Next Talk on</a:t>
+            </a:r>
+            <a:r>
+              <a:rPr lang="ru-RU" dirty="0">
+                <a:solidFill>
+                  <a:schemeClr val="tx1">
+                    <a:lumMod val="85000"/>
+                    <a:lumOff val="15000"/>
+                  </a:schemeClr>
                 </a:solidFill>
               </a:rPr>
-              <a:t>27</a:t>
-            </a:r>
-            <a:r>
-              <a:rPr lang="en-US" sz="2700" dirty="0" smtClean="0">
-                <a:solidFill>
-                  <a:srgbClr val="1E1E1E"/>
+              <a:t> </a:t>
+            </a:r>
+            <a:r>
+              <a:rPr lang="de-AT" dirty="0" err="1">
+                <a:solidFill>
+                  <a:schemeClr val="tx1">
+                    <a:lumMod val="85000"/>
+                    <a:lumOff val="15000"/>
+                  </a:schemeClr>
                 </a:solidFill>
               </a:rPr>
-              <a:t>.05.2023</a:t>
-            </a:r>
-          </a:p>
-          <a:p>
-            <a:pPr marL="0" indent="0">
-              <a:buNone/>
-            </a:pPr>
-            <a:r>
-              <a:rPr lang="de-AT" b="1" dirty="0" smtClean="0"/>
-              <a:t>Florence</a:t>
-            </a:r>
-            <a:r>
-              <a:rPr lang="de-AT" b="1" dirty="0"/>
-              <a:t>, Grand Hotel </a:t>
-            </a:r>
-            <a:r>
-              <a:rPr lang="de-AT" b="1" dirty="0" err="1" smtClean="0"/>
-              <a:t>Mediterraneo</a:t>
-            </a:r>
-            <a:r>
-              <a:rPr lang="en-US" dirty="0" smtClean="0">
-                <a:solidFill>
-                  <a:srgbClr val="1E1E1E"/>
+              <a:t>Europython</a:t>
+            </a:r>
+            <a:r>
+              <a:rPr lang="de-AT" dirty="0">
+                <a:solidFill>
+                  <a:schemeClr val="tx1">
+                    <a:lumMod val="85000"/>
+                    <a:lumOff val="15000"/>
+                  </a:schemeClr>
+                </a:solidFill>
+              </a:rPr>
+              <a:t> 2023</a:t>
+            </a:r>
+            <a:r>
+              <a:rPr lang="de-AT">
+                <a:solidFill>
+                  <a:schemeClr val="tx1">
+                    <a:lumMod val="85000"/>
+                    <a:lumOff val="15000"/>
+                  </a:schemeClr>
                 </a:solidFill>
               </a:rPr>
               <a:t>, </a:t>
             </a:r>
-            <a:r>
-              <a:rPr lang="de-AT" b="1" cap="all" dirty="0" smtClean="0"/>
-              <a:t>PIZZA</a:t>
+            <a:endParaRPr lang="de-AT" smtClean="0">
+              <a:solidFill>
+                <a:schemeClr val="tx1">
+                  <a:lumMod val="85000"/>
+                  <a:lumOff val="15000"/>
+                </a:schemeClr>
+              </a:solidFill>
+            </a:endParaRPr>
+          </a:p>
+          <a:p>
+            <a:pPr marL="0" indent="0">
+              <a:buNone/>
+            </a:pPr>
+            <a:r>
+              <a:rPr lang="de-AT" smtClean="0">
+                <a:solidFill>
+                  <a:schemeClr val="tx1">
+                    <a:lumMod val="85000"/>
+                    <a:lumOff val="15000"/>
+                  </a:schemeClr>
+                </a:solidFill>
+              </a:rPr>
+              <a:t>17-23 </a:t>
+            </a:r>
+            <a:r>
+              <a:rPr lang="de-AT" dirty="0" err="1">
+                <a:solidFill>
+                  <a:schemeClr val="tx1">
+                    <a:lumMod val="85000"/>
+                    <a:lumOff val="15000"/>
+                  </a:schemeClr>
+                </a:solidFill>
+              </a:rPr>
+              <a:t>July</a:t>
+            </a:r>
+            <a:r>
+              <a:rPr lang="de-AT" dirty="0">
+                <a:solidFill>
+                  <a:schemeClr val="tx1">
+                    <a:lumMod val="85000"/>
+                    <a:lumOff val="15000"/>
+                  </a:schemeClr>
+                </a:solidFill>
+              </a:rPr>
+              <a:t> in </a:t>
+            </a:r>
+            <a:r>
+              <a:rPr lang="de-AT" dirty="0" err="1">
+                <a:solidFill>
+                  <a:schemeClr val="tx1">
+                    <a:lumMod val="85000"/>
+                    <a:lumOff val="15000"/>
+                  </a:schemeClr>
+                </a:solidFill>
+              </a:rPr>
+              <a:t>Prague</a:t>
+            </a:r>
+            <a:r>
+              <a:rPr lang="de-AT" dirty="0">
+                <a:solidFill>
+                  <a:schemeClr val="tx1">
+                    <a:lumMod val="85000"/>
+                    <a:lumOff val="15000"/>
+                  </a:schemeClr>
+                </a:solidFill>
+              </a:rPr>
+              <a:t>.</a:t>
             </a:r>
             <a:r>
               <a:rPr lang="de-AT" dirty="0" smtClean="0"/>
@@ -5520,7 +5561,7 @@
             <a:fld id="{66FADE1B-0456-406C-83D7-FFC7E41D47BD}" type="datetime1">
               <a:rPr lang="de-AT" smtClean="0"/>
               <a:pPr/>
-              <a:t>26.05.2023</a:t>
+              <a:t>27.05.2023</a:t>
             </a:fld>
             <a:endParaRPr lang="de-AT" dirty="0"/>
           </a:p>

</xml_diff>